<commit_message>
Added transformation output domension to the slides
</commit_message>
<xml_diff>
--- a/documentation/presentation/Token-level author diarization using clustering of stylistic.pptx
+++ b/documentation/presentation/Token-level author diarization using clustering of stylistic.pptx
@@ -27656,6 +27656,52 @@
           <a:chExt cx="0" cy="0"/>
         </a:xfrm>
       </p:grpSpPr>
+      <p:pic>
+        <p:nvPicPr>
+          <p:cNvPr id="3" name="Content Placeholder 2"/>
+          <p:cNvPicPr>
+            <a:picLocks noGrp="1" noChangeAspect="1"/>
+          </p:cNvPicPr>
+          <p:nvPr>
+            <p:ph sz="half" idx="2"/>
+          </p:nvPr>
+        </p:nvPicPr>
+        <p:blipFill>
+          <a:blip r:embed="rId3"/>
+          <a:stretch>
+            <a:fillRect/>
+          </a:stretch>
+        </p:blipFill>
+        <p:spPr>
+          <a:xfrm>
+            <a:off x="962290" y="2704779"/>
+            <a:ext cx="4912782" cy="3684587"/>
+          </a:xfrm>
+        </p:spPr>
+      </p:pic>
+      <p:pic>
+        <p:nvPicPr>
+          <p:cNvPr id="11" name="Content Placeholder 10"/>
+          <p:cNvPicPr>
+            <a:picLocks noGrp="1" noChangeAspect="1"/>
+          </p:cNvPicPr>
+          <p:nvPr>
+            <p:ph sz="quarter" idx="4"/>
+          </p:nvPr>
+        </p:nvPicPr>
+        <p:blipFill>
+          <a:blip r:embed="rId4"/>
+          <a:stretch>
+            <a:fillRect/>
+          </a:stretch>
+        </p:blipFill>
+        <p:spPr>
+          <a:xfrm>
+            <a:off x="6307403" y="2704779"/>
+            <a:ext cx="4912782" cy="3684587"/>
+          </a:xfrm>
+        </p:spPr>
+      </p:pic>
       <p:sp>
         <p:nvSpPr>
           <p:cNvPr id="4" name="Title 3"/>
@@ -27723,29 +27769,6 @@
           </a:p>
         </p:txBody>
       </p:sp>
-      <p:pic>
-        <p:nvPicPr>
-          <p:cNvPr id="3" name="Content Placeholder 2"/>
-          <p:cNvPicPr>
-            <a:picLocks noGrp="1" noChangeAspect="1"/>
-          </p:cNvPicPr>
-          <p:nvPr>
-            <p:ph sz="half" idx="2"/>
-          </p:nvPr>
-        </p:nvPicPr>
-        <p:blipFill>
-          <a:blip r:embed="rId3"/>
-          <a:stretch>
-            <a:fillRect/>
-          </a:stretch>
-        </p:blipFill>
-        <p:spPr>
-          <a:xfrm>
-            <a:off x="962290" y="2887663"/>
-            <a:ext cx="4912782" cy="3684587"/>
-          </a:xfrm>
-        </p:spPr>
-      </p:pic>
       <p:sp>
         <p:nvSpPr>
           <p:cNvPr id="7" name="Text Placeholder 6"/>
@@ -27774,29 +27797,6 @@
           </a:p>
         </p:txBody>
       </p:sp>
-      <p:pic>
-        <p:nvPicPr>
-          <p:cNvPr id="11" name="Content Placeholder 10"/>
-          <p:cNvPicPr>
-            <a:picLocks noGrp="1" noChangeAspect="1"/>
-          </p:cNvPicPr>
-          <p:nvPr>
-            <p:ph sz="quarter" idx="4"/>
-          </p:nvPr>
-        </p:nvPicPr>
-        <p:blipFill>
-          <a:blip r:embed="rId4"/>
-          <a:stretch>
-            <a:fillRect/>
-          </a:stretch>
-        </p:blipFill>
-        <p:spPr>
-          <a:xfrm>
-            <a:off x="6307403" y="2887663"/>
-            <a:ext cx="4912782" cy="3684587"/>
-          </a:xfrm>
-        </p:spPr>
-      </p:pic>
       <p:graphicFrame>
         <p:nvGraphicFramePr>
           <p:cNvPr id="9" name="Content Placeholder 3"/>
@@ -27823,7 +27823,7 @@
         </p:nvSpPr>
         <p:spPr>
           <a:xfrm>
-            <a:off x="5556343" y="4440097"/>
+            <a:off x="5556343" y="4257213"/>
             <a:ext cx="1069789" cy="579717"/>
           </a:xfrm>
           <a:prstGeom prst="rightArrow">
@@ -27863,7 +27863,7 @@
         </p:nvSpPr>
         <p:spPr>
           <a:xfrm>
-            <a:off x="586441" y="2887565"/>
+            <a:off x="586441" y="6334150"/>
             <a:ext cx="11019118" cy="369332"/>
           </a:xfrm>
           <a:prstGeom prst="rect">
@@ -31264,22 +31264,14 @@
           <a:lstStyle/>
           <a:p>
             <a:r>
-              <a:rPr lang="hr-HR" dirty="0" err="1"/>
-              <a:t>Uses</a:t>
-            </a:r>
-            <a:r>
-              <a:rPr lang="hr-HR" dirty="0"/>
-              <a:t> </a:t>
-            </a:r>
-            <a:r>
               <a:rPr lang="en-US" dirty="0"/>
-              <a:t>a trainable transformation in order to adopt the feature space for clustering</a:t>
+              <a:t>A trainable transformation to adapt the feature space for clustering</a:t>
             </a:r>
           </a:p>
           <a:p>
             <a:r>
               <a:rPr lang="en-US" dirty="0"/>
-              <a:t>Linear or elementwise linear transformation </a:t>
+              <a:t>Linear (output dimension 40) or elementwise linear transformation </a:t>
             </a:r>
             <a:r>
               <a:rPr lang="en-US" i="1" dirty="0"/>

</xml_diff>